<commit_message>
Add ppt and papers
</commit_message>
<xml_diff>
--- a/MLP_Project/0407_0408(prof)/210407_MLP_HWlee.pptx
+++ b/MLP_Project/0407_0408(prof)/210407_MLP_HWlee.pptx
@@ -5,13 +5,14 @@
     <p:sldMasterId id="2147483660" r:id="rId1"/>
   </p:sldMasterIdLst>
   <p:notesMasterIdLst>
-    <p:notesMasterId r:id="rId6"/>
+    <p:notesMasterId r:id="rId7"/>
   </p:notesMasterIdLst>
   <p:sldIdLst>
-    <p:sldId id="260" r:id="rId2"/>
-    <p:sldId id="289" r:id="rId3"/>
-    <p:sldId id="288" r:id="rId4"/>
-    <p:sldId id="290" r:id="rId5"/>
+    <p:sldId id="288" r:id="rId2"/>
+    <p:sldId id="290" r:id="rId3"/>
+    <p:sldId id="291" r:id="rId4"/>
+    <p:sldId id="292" r:id="rId5"/>
+    <p:sldId id="289" r:id="rId6"/>
   </p:sldIdLst>
   <p:sldSz cx="9144000" cy="6858000" type="screen4x3"/>
   <p:notesSz cx="6858000" cy="9144000"/>
@@ -4281,10 +4282,10 @@
       </p:grpSpPr>
       <p:sp>
         <p:nvSpPr>
-          <p:cNvPr id="2" name="제목 1">
+          <p:cNvPr id="2" name="슬라이드 번호 개체 틀 1">
             <a:extLst>
               <a:ext uri="{FF2B5EF4-FFF2-40B4-BE49-F238E27FC236}">
-                <a16:creationId xmlns:a16="http://schemas.microsoft.com/office/drawing/2014/main" id="{64C07551-E58C-49B1-9FEE-C254F4631DC2}"/>
+                <a16:creationId xmlns:a16="http://schemas.microsoft.com/office/drawing/2014/main" id="{46CC4388-5CBE-4814-8E8B-FAB97B394E89}"/>
               </a:ext>
             </a:extLst>
           </p:cNvPr>
@@ -4292,92 +4293,314 @@
             <a:spLocks noGrp="1"/>
           </p:cNvSpPr>
           <p:nvPr>
-            <p:ph type="ctrTitle"/>
+            <p:ph type="sldNum" sz="quarter" idx="12"/>
           </p:nvPr>
         </p:nvSpPr>
         <p:spPr/>
+        <p:txBody>
+          <a:bodyPr/>
+          <a:lstStyle/>
+          <a:p>
+            <a:fld id="{A1806F79-321D-440B-81D1-3409D93E33A7}" type="slidenum">
+              <a:rPr lang="ko-KR" altLang="en-US" smtClean="0"/>
+              <a:pPr/>
+              <a:t>1</a:t>
+            </a:fld>
+            <a:endParaRPr lang="ko-KR" altLang="en-US"/>
+          </a:p>
+        </p:txBody>
+      </p:sp>
+      <p:sp>
+        <p:nvSpPr>
+          <p:cNvPr id="3" name="제목 2">
+            <a:extLst>
+              <a:ext uri="{FF2B5EF4-FFF2-40B4-BE49-F238E27FC236}">
+                <a16:creationId xmlns:a16="http://schemas.microsoft.com/office/drawing/2014/main" id="{047B81AA-680E-486D-99E8-DCEB0D351281}"/>
+              </a:ext>
+            </a:extLst>
+          </p:cNvPr>
+          <p:cNvSpPr>
+            <a:spLocks noGrp="1"/>
+          </p:cNvSpPr>
+          <p:nvPr>
+            <p:ph type="title"/>
+          </p:nvPr>
+        </p:nvSpPr>
+        <p:spPr>
+          <a:xfrm>
+            <a:off x="136664" y="54593"/>
+            <a:ext cx="7886700" cy="665018"/>
+          </a:xfrm>
+        </p:spPr>
+        <p:txBody>
+          <a:bodyPr/>
+          <a:lstStyle/>
+          <a:p>
+            <a:r>
+              <a:rPr lang="en-US" altLang="ko-KR"/>
+              <a:t>Proposal – DeepRL</a:t>
+            </a:r>
+            <a:endParaRPr lang="ko-KR" altLang="en-US" dirty="0"/>
+          </a:p>
+        </p:txBody>
+      </p:sp>
+      <p:sp>
+        <p:nvSpPr>
+          <p:cNvPr id="4" name="텍스트 개체 틀 3">
+            <a:extLst>
+              <a:ext uri="{FF2B5EF4-FFF2-40B4-BE49-F238E27FC236}">
+                <a16:creationId xmlns:a16="http://schemas.microsoft.com/office/drawing/2014/main" id="{A599E83A-0476-45EA-AE26-18AE31709B9B}"/>
+              </a:ext>
+            </a:extLst>
+          </p:cNvPr>
+          <p:cNvSpPr>
+            <a:spLocks noGrp="1"/>
+          </p:cNvSpPr>
+          <p:nvPr>
+            <p:ph type="body" sz="quarter" idx="13"/>
+          </p:nvPr>
+        </p:nvSpPr>
+        <p:spPr>
+          <a:xfrm>
+            <a:off x="207963" y="955954"/>
+            <a:ext cx="8794721" cy="5394512"/>
+          </a:xfrm>
+        </p:spPr>
         <p:txBody>
           <a:bodyPr>
             <a:normAutofit/>
           </a:bodyPr>
           <a:lstStyle/>
           <a:p>
+            <a:pPr>
+              <a:lnSpc>
+                <a:spcPct val="100000"/>
+              </a:lnSpc>
+            </a:pPr>
             <a:r>
               <a:rPr lang="en-US" altLang="ko-KR"/>
-              <a:t>2021 MLP</a:t>
-            </a:r>
-            <a:r>
-              <a:rPr lang="ko-KR" altLang="en-US"/>
-              <a:t> </a:t>
+              <a:t>Suggestion</a:t>
+            </a:r>
+          </a:p>
+          <a:p>
+            <a:pPr lvl="1">
+              <a:lnSpc>
+                <a:spcPct val="100000"/>
+              </a:lnSpc>
+            </a:pPr>
+            <a:r>
+              <a:rPr lang="en-US" altLang="ko-KR" b="1">
+                <a:solidFill>
+                  <a:srgbClr val="FF0000"/>
+                </a:solidFill>
+              </a:rPr>
+              <a:t>Multi-agent</a:t>
             </a:r>
             <a:r>
               <a:rPr lang="en-US" altLang="ko-KR"/>
-              <a:t>team meeting 04.07</a:t>
-            </a:r>
-            <a:endParaRPr lang="ko-KR" altLang="en-US" dirty="0"/>
-          </a:p>
-        </p:txBody>
-      </p:sp>
-      <p:sp>
-        <p:nvSpPr>
-          <p:cNvPr id="3" name="부제목 2">
+              <a:t> Deep Reinforment Learning with </a:t>
+            </a:r>
+            <a:r>
+              <a:rPr lang="en-US" altLang="ko-KR" b="1">
+                <a:solidFill>
+                  <a:srgbClr val="FF0000"/>
+                </a:solidFill>
+              </a:rPr>
+              <a:t>Adversarial agent</a:t>
+            </a:r>
+          </a:p>
+          <a:p>
+            <a:pPr lvl="1">
+              <a:lnSpc>
+                <a:spcPct val="100000"/>
+              </a:lnSpc>
+            </a:pPr>
+            <a:endParaRPr lang="en-US" altLang="ko-KR"/>
+          </a:p>
+          <a:p>
+            <a:pPr lvl="1">
+              <a:lnSpc>
+                <a:spcPct val="100000"/>
+              </a:lnSpc>
+            </a:pPr>
+            <a:r>
+              <a:rPr lang="en-US" altLang="ko-KR"/>
+              <a:t>Multi-agent Deep RL</a:t>
+            </a:r>
+          </a:p>
+          <a:p>
+            <a:pPr lvl="1">
+              <a:lnSpc>
+                <a:spcPct val="100000"/>
+              </a:lnSpc>
+            </a:pPr>
+            <a:endParaRPr lang="en-US" altLang="ko-KR"/>
+          </a:p>
+          <a:p>
+            <a:pPr lvl="1">
+              <a:lnSpc>
+                <a:spcPct val="100000"/>
+              </a:lnSpc>
+            </a:pPr>
+            <a:endParaRPr lang="en-US" altLang="ko-KR"/>
+          </a:p>
+          <a:p>
+            <a:pPr lvl="1">
+              <a:lnSpc>
+                <a:spcPct val="100000"/>
+              </a:lnSpc>
+            </a:pPr>
+            <a:endParaRPr lang="en-US" altLang="ko-KR"/>
+          </a:p>
+          <a:p>
+            <a:pPr lvl="1">
+              <a:lnSpc>
+                <a:spcPct val="100000"/>
+              </a:lnSpc>
+            </a:pPr>
+            <a:endParaRPr lang="en-US" altLang="ko-KR"/>
+          </a:p>
+          <a:p>
+            <a:pPr lvl="1">
+              <a:lnSpc>
+                <a:spcPct val="100000"/>
+              </a:lnSpc>
+            </a:pPr>
+            <a:endParaRPr lang="en-US" altLang="ko-KR"/>
+          </a:p>
+          <a:p>
+            <a:pPr lvl="1">
+              <a:lnSpc>
+                <a:spcPct val="100000"/>
+              </a:lnSpc>
+            </a:pPr>
+            <a:endParaRPr lang="en-US" altLang="ko-KR"/>
+          </a:p>
+          <a:p>
+            <a:pPr lvl="1">
+              <a:lnSpc>
+                <a:spcPct val="100000"/>
+              </a:lnSpc>
+            </a:pPr>
+            <a:endParaRPr lang="en-US" altLang="ko-KR"/>
+          </a:p>
+          <a:p>
+            <a:pPr lvl="1">
+              <a:lnSpc>
+                <a:spcPct val="100000"/>
+              </a:lnSpc>
+            </a:pPr>
+            <a:endParaRPr lang="en-US" altLang="ko-KR"/>
+          </a:p>
+          <a:p>
+            <a:pPr lvl="1">
+              <a:lnSpc>
+                <a:spcPct val="100000"/>
+              </a:lnSpc>
+            </a:pPr>
+            <a:endParaRPr lang="en-US" altLang="ko-KR"/>
+          </a:p>
+          <a:p>
+            <a:pPr lvl="1">
+              <a:lnSpc>
+                <a:spcPct val="100000"/>
+              </a:lnSpc>
+            </a:pPr>
+            <a:endParaRPr lang="en-US" altLang="ko-KR"/>
+          </a:p>
+          <a:p>
+            <a:pPr lvl="2">
+              <a:lnSpc>
+                <a:spcPct val="100000"/>
+              </a:lnSpc>
+            </a:pPr>
+            <a:endParaRPr lang="en-US" altLang="ko-KR"/>
+          </a:p>
+          <a:p>
+            <a:pPr lvl="1">
+              <a:lnSpc>
+                <a:spcPct val="100000"/>
+              </a:lnSpc>
+            </a:pPr>
+            <a:endParaRPr lang="en-US" altLang="ko-KR" dirty="0"/>
+          </a:p>
+          <a:p>
+            <a:pPr>
+              <a:lnSpc>
+                <a:spcPct val="100000"/>
+              </a:lnSpc>
+            </a:pPr>
+            <a:endParaRPr lang="en-US" altLang="ko-KR" dirty="0"/>
+          </a:p>
+          <a:p>
+            <a:pPr lvl="1">
+              <a:lnSpc>
+                <a:spcPct val="100000"/>
+              </a:lnSpc>
+            </a:pPr>
+            <a:endParaRPr lang="en-US" altLang="ko-KR" dirty="0"/>
+          </a:p>
+          <a:p>
+            <a:pPr lvl="2">
+              <a:lnSpc>
+                <a:spcPct val="100000"/>
+              </a:lnSpc>
+            </a:pPr>
+            <a:endParaRPr lang="en-US" altLang="ko-KR" dirty="0"/>
+          </a:p>
+          <a:p>
+            <a:pPr lvl="1">
+              <a:lnSpc>
+                <a:spcPct val="100000"/>
+              </a:lnSpc>
+            </a:pPr>
+            <a:endParaRPr lang="en-US" altLang="ko-KR" dirty="0"/>
+          </a:p>
+          <a:p>
+            <a:pPr lvl="1">
+              <a:lnSpc>
+                <a:spcPct val="100000"/>
+              </a:lnSpc>
+            </a:pPr>
+            <a:endParaRPr lang="en-US" altLang="ko-KR" dirty="0"/>
+          </a:p>
+        </p:txBody>
+      </p:sp>
+      <p:pic>
+        <p:nvPicPr>
+          <p:cNvPr id="6" name="그림 5">
             <a:extLst>
               <a:ext uri="{FF2B5EF4-FFF2-40B4-BE49-F238E27FC236}">
-                <a16:creationId xmlns:a16="http://schemas.microsoft.com/office/drawing/2014/main" id="{4FD0D42D-C036-4DD2-8230-C91BF0E11FFE}"/>
+                <a16:creationId xmlns:a16="http://schemas.microsoft.com/office/drawing/2014/main" id="{A211F99E-7342-4753-AF51-B5D91EBD29F6}"/>
               </a:ext>
             </a:extLst>
           </p:cNvPr>
-          <p:cNvSpPr>
-            <a:spLocks noGrp="1"/>
-          </p:cNvSpPr>
-          <p:nvPr>
-            <p:ph type="subTitle" idx="1"/>
-          </p:nvPr>
-        </p:nvSpPr>
-        <p:spPr/>
-        <p:txBody>
-          <a:bodyPr/>
-          <a:lstStyle/>
-          <a:p>
-            <a:r>
-              <a:rPr lang="en-US" altLang="ko-KR" spc="-1">
-                <a:uFill>
-                  <a:solidFill>
-                    <a:srgbClr val="FFFFFF"/>
-                  </a:solidFill>
-                </a:uFill>
-                <a:latin typeface="나눔바른고딕" panose="020B0603020101020101" pitchFamily="50" charset="-127"/>
-                <a:ea typeface="나눔바른고딕" panose="020B0603020101020101" pitchFamily="50" charset="-127"/>
-              </a:rPr>
-              <a:t>Yonsei University</a:t>
-            </a:r>
-          </a:p>
-          <a:p>
-            <a:r>
-              <a:rPr lang="en-US" altLang="ko-KR" spc="-1">
-                <a:uFill>
-                  <a:solidFill>
-                    <a:srgbClr val="FFFFFF"/>
-                  </a:solidFill>
-                </a:uFill>
-                <a:latin typeface="나눔바른고딕" panose="020B0603020101020101" pitchFamily="50" charset="-127"/>
-                <a:ea typeface="나눔바른고딕" panose="020B0603020101020101" pitchFamily="50" charset="-127"/>
-              </a:rPr>
-              <a:t>Machine Learning Project Team 09</a:t>
-            </a:r>
-            <a:endParaRPr lang="ko-KR" altLang="en-US"/>
-          </a:p>
-          <a:p>
-            <a:endParaRPr lang="ko-KR" altLang="en-US"/>
-          </a:p>
-        </p:txBody>
-      </p:sp>
-      <p:sp>
-        <p:nvSpPr>
-          <p:cNvPr id="4" name="텍스트 개체 틀 3">
+          <p:cNvPicPr>
+            <a:picLocks noChangeAspect="1"/>
+          </p:cNvPicPr>
+          <p:nvPr/>
+        </p:nvPicPr>
+        <p:blipFill rotWithShape="1">
+          <a:blip r:embed="rId2"/>
+          <a:srcRect t="2804"/>
+          <a:stretch/>
+        </p:blipFill>
+        <p:spPr>
+          <a:xfrm>
+            <a:off x="796369" y="2489055"/>
+            <a:ext cx="7617908" cy="2680448"/>
+          </a:xfrm>
+          <a:prstGeom prst="rect">
+            <a:avLst/>
+          </a:prstGeom>
+        </p:spPr>
+      </p:pic>
+      <p:sp>
+        <p:nvSpPr>
+          <p:cNvPr id="8" name="바닥글 개체 틀 7">
             <a:extLst>
               <a:ext uri="{FF2B5EF4-FFF2-40B4-BE49-F238E27FC236}">
-                <a16:creationId xmlns:a16="http://schemas.microsoft.com/office/drawing/2014/main" id="{68C190AA-2027-4928-9CAA-DB37FF9E8D7F}"/>
+                <a16:creationId xmlns:a16="http://schemas.microsoft.com/office/drawing/2014/main" id="{283145E8-6F5E-4028-92FA-FEEC2EBC95D0}"/>
               </a:ext>
             </a:extLst>
           </p:cNvPr>
@@ -4385,21 +4608,48 @@
             <a:spLocks noGrp="1"/>
           </p:cNvSpPr>
           <p:nvPr>
-            <p:ph type="body" sz="quarter" idx="13"/>
-          </p:nvPr>
-        </p:nvSpPr>
-        <p:spPr/>
+            <p:ph type="ftr" sz="quarter" idx="11"/>
+          </p:nvPr>
+        </p:nvSpPr>
+        <p:spPr>
+          <a:xfrm>
+            <a:off x="136664" y="6244291"/>
+            <a:ext cx="8866020" cy="212349"/>
+          </a:xfrm>
+        </p:spPr>
         <p:txBody>
           <a:bodyPr/>
           <a:lstStyle/>
           <a:p>
             <a:r>
-              <a:rPr lang="en-US" altLang="ko-KR" err="1"/>
-              <a:t>Hyeonwoo</a:t>
-            </a:r>
-            <a:r>
-              <a:rPr lang="en-US" altLang="ko-KR"/>
-              <a:t> Lee</a:t>
+              <a:rPr lang="en-US" altLang="ko-KR" b="0" i="0">
+                <a:solidFill>
+                  <a:srgbClr val="222222"/>
+                </a:solidFill>
+                <a:effectLst/>
+                <a:latin typeface="Arial" panose="020B0604020202020204" pitchFamily="34" charset="0"/>
+              </a:rPr>
+              <a:t>Zhang, Ke, et al. "Multi-vehicle routing problems with soft time windows: A multi-agent reinforcement learning approach." </a:t>
+            </a:r>
+            <a:r>
+              <a:rPr lang="en-US" altLang="ko-KR" b="0" i="1">
+                <a:solidFill>
+                  <a:srgbClr val="222222"/>
+                </a:solidFill>
+                <a:effectLst/>
+                <a:latin typeface="Arial" panose="020B0604020202020204" pitchFamily="34" charset="0"/>
+              </a:rPr>
+              <a:t>Transportation Research Part C: Emerging Technologies</a:t>
+            </a:r>
+            <a:r>
+              <a:rPr lang="en-US" altLang="ko-KR" b="0" i="0">
+                <a:solidFill>
+                  <a:srgbClr val="222222"/>
+                </a:solidFill>
+                <a:effectLst/>
+                <a:latin typeface="Arial" panose="020B0604020202020204" pitchFamily="34" charset="0"/>
+              </a:rPr>
+              <a:t> 121 (2020): 102861.</a:t>
             </a:r>
             <a:endParaRPr lang="ko-KR" altLang="en-US"/>
           </a:p>
@@ -4408,7 +4658,7 @@
     </p:spTree>
     <p:extLst>
       <p:ext uri="{BB962C8B-B14F-4D97-AF65-F5344CB8AC3E}">
-        <p14:creationId xmlns:p14="http://schemas.microsoft.com/office/powerpoint/2010/main" val="600017923"/>
+        <p14:creationId xmlns:p14="http://schemas.microsoft.com/office/powerpoint/2010/main" val="1154020118"/>
       </p:ext>
     </p:extLst>
   </p:cSld>
@@ -4493,7 +4743,7 @@
           <a:p>
             <a:r>
               <a:rPr lang="en-US" altLang="ko-KR"/>
-              <a:t>RAWSim-O (Remind)</a:t>
+              <a:t>Proposal – DeepRL</a:t>
             </a:r>
             <a:endParaRPr lang="ko-KR" altLang="en-US" dirty="0"/>
           </a:p>
@@ -4523,7 +4773,7 @@
         </p:spPr>
         <p:txBody>
           <a:bodyPr>
-            <a:normAutofit/>
+            <a:normAutofit lnSpcReduction="10000"/>
           </a:bodyPr>
           <a:lstStyle/>
           <a:p>
@@ -4534,7 +4784,7 @@
             </a:pPr>
             <a:r>
               <a:rPr lang="en-US" altLang="ko-KR"/>
-              <a:t>Tutorial</a:t>
+              <a:t>RL</a:t>
             </a:r>
           </a:p>
           <a:p>
@@ -4545,7 +4795,29 @@
             </a:pPr>
             <a:r>
               <a:rPr lang="en-US" altLang="ko-KR"/>
-              <a:t>Setup</a:t>
+              <a:t>Problem</a:t>
+            </a:r>
+          </a:p>
+          <a:p>
+            <a:pPr lvl="2">
+              <a:lnSpc>
+                <a:spcPct val="100000"/>
+              </a:lnSpc>
+            </a:pPr>
+            <a:r>
+              <a:rPr lang="en-US" altLang="ko-KR"/>
+              <a:t>Overall logistics → Vehicle Routing Problem only</a:t>
+            </a:r>
+          </a:p>
+          <a:p>
+            <a:pPr lvl="2">
+              <a:lnSpc>
+                <a:spcPct val="100000"/>
+              </a:lnSpc>
+            </a:pPr>
+            <a:r>
+              <a:rPr lang="en-US" altLang="ko-KR"/>
+              <a:t>Fix other setting (ex. Task allocation, Order assignment)</a:t>
             </a:r>
           </a:p>
           <a:p>
@@ -4554,10 +4826,59 @@
                 <a:spcPct val="100000"/>
               </a:lnSpc>
             </a:pPr>
+            <a:endParaRPr lang="en-US" altLang="ko-KR"/>
+          </a:p>
+          <a:p>
+            <a:pPr lvl="1">
+              <a:lnSpc>
+                <a:spcPct val="100000"/>
+              </a:lnSpc>
+            </a:pPr>
             <a:r>
               <a:rPr lang="en-US" altLang="ko-KR"/>
-              <a:t>Simulation</a:t>
-            </a:r>
+              <a:t>State, Action, Reward</a:t>
+            </a:r>
+          </a:p>
+          <a:p>
+            <a:pPr lvl="2">
+              <a:lnSpc>
+                <a:spcPct val="100000"/>
+              </a:lnSpc>
+            </a:pPr>
+            <a:r>
+              <a:rPr lang="en-US" altLang="ko-KR"/>
+              <a:t>Replenishment, pick station status and action (Embedded, Empty)</a:t>
+            </a:r>
+          </a:p>
+          <a:p>
+            <a:pPr lvl="2">
+              <a:lnSpc>
+                <a:spcPct val="100000"/>
+              </a:lnSpc>
+            </a:pPr>
+            <a:r>
+              <a:rPr lang="en-US" altLang="ko-KR"/>
+              <a:t>Mobile robot location(for every point) and action(←↑↓→)</a:t>
+            </a:r>
+          </a:p>
+          <a:p>
+            <a:pPr lvl="2">
+              <a:lnSpc>
+                <a:spcPct val="100000"/>
+              </a:lnSpc>
+            </a:pPr>
+            <a:r>
+              <a:rPr lang="en-US" altLang="ko-KR"/>
+              <a:t>Reward: -Cost </a:t>
+            </a:r>
+          </a:p>
+          <a:p>
+            <a:pPr lvl="2">
+              <a:lnSpc>
+                <a:spcPct val="100000"/>
+              </a:lnSpc>
+            </a:pPr>
+            <a:endParaRPr lang="en-US" altLang="ko-KR"/>
           </a:p>
           <a:p>
             <a:pPr lvl="1">
@@ -4567,7 +4888,55 @@
             </a:pPr>
             <a:r>
               <a:rPr lang="en-US" altLang="ko-KR"/>
-              <a:t>Instance</a:t>
+              <a:t>Agent</a:t>
+            </a:r>
+          </a:p>
+          <a:p>
+            <a:pPr lvl="2">
+              <a:lnSpc>
+                <a:spcPct val="100000"/>
+              </a:lnSpc>
+            </a:pPr>
+            <a:r>
+              <a:rPr lang="en-US" altLang="ko-KR"/>
+              <a:t>Normal: minimize total cost</a:t>
+            </a:r>
+          </a:p>
+          <a:p>
+            <a:pPr lvl="2">
+              <a:lnSpc>
+                <a:spcPct val="100000"/>
+              </a:lnSpc>
+            </a:pPr>
+            <a:r>
+              <a:rPr lang="en-US" altLang="ko-KR" b="1"/>
+              <a:t>Adversarial agent</a:t>
+            </a:r>
+            <a:r>
+              <a:rPr lang="en-US" altLang="ko-KR"/>
+              <a:t> : maximize total cost</a:t>
+            </a:r>
+          </a:p>
+          <a:p>
+            <a:pPr lvl="3">
+              <a:lnSpc>
+                <a:spcPct val="100000"/>
+              </a:lnSpc>
+            </a:pPr>
+            <a:r>
+              <a:rPr lang="en-US" altLang="ko-KR"/>
+              <a:t>Intercept other pod due to urgent situation</a:t>
+            </a:r>
+          </a:p>
+          <a:p>
+            <a:pPr lvl="3">
+              <a:lnSpc>
+                <a:spcPct val="100000"/>
+              </a:lnSpc>
+            </a:pPr>
+            <a:r>
+              <a:rPr lang="en-US" altLang="ko-KR"/>
+              <a:t>Simply move around w/o pick &amp; order </a:t>
             </a:r>
           </a:p>
           <a:p>
@@ -4576,10 +4945,66 @@
                 <a:spcPct val="100000"/>
               </a:lnSpc>
             </a:pPr>
+            <a:endParaRPr lang="en-US" altLang="ko-KR"/>
+          </a:p>
+          <a:p>
+            <a:pPr lvl="1">
+              <a:lnSpc>
+                <a:spcPct val="100000"/>
+              </a:lnSpc>
+            </a:pPr>
             <a:r>
               <a:rPr lang="en-US" altLang="ko-KR"/>
-              <a:t>Etc</a:t>
-            </a:r>
+              <a:t>Training Algorithm (Next)</a:t>
+            </a:r>
+          </a:p>
+          <a:p>
+            <a:pPr lvl="2">
+              <a:lnSpc>
+                <a:spcPct val="100000"/>
+              </a:lnSpc>
+            </a:pPr>
+            <a:endParaRPr lang="en-US" altLang="ko-KR"/>
+          </a:p>
+          <a:p>
+            <a:pPr lvl="1">
+              <a:lnSpc>
+                <a:spcPct val="100000"/>
+              </a:lnSpc>
+            </a:pPr>
+            <a:endParaRPr lang="en-US" altLang="ko-KR"/>
+          </a:p>
+          <a:p>
+            <a:pPr lvl="1">
+              <a:lnSpc>
+                <a:spcPct val="100000"/>
+              </a:lnSpc>
+            </a:pPr>
+            <a:endParaRPr lang="en-US" altLang="ko-KR"/>
+          </a:p>
+          <a:p>
+            <a:pPr lvl="1">
+              <a:lnSpc>
+                <a:spcPct val="100000"/>
+              </a:lnSpc>
+            </a:pPr>
+            <a:endParaRPr lang="en-US" altLang="ko-KR"/>
+          </a:p>
+          <a:p>
+            <a:pPr lvl="2">
+              <a:lnSpc>
+                <a:spcPct val="100000"/>
+              </a:lnSpc>
+            </a:pPr>
+            <a:endParaRPr lang="en-US" altLang="ko-KR"/>
+          </a:p>
+          <a:p>
+            <a:pPr lvl="1">
+              <a:lnSpc>
+                <a:spcPct val="100000"/>
+              </a:lnSpc>
+            </a:pPr>
+            <a:endParaRPr lang="en-US" altLang="ko-KR" dirty="0"/>
           </a:p>
           <a:p>
             <a:pPr>
@@ -4587,94 +5012,7 @@
                 <a:spcPct val="100000"/>
               </a:lnSpc>
             </a:pPr>
-            <a:endParaRPr lang="en-US" altLang="ko-KR"/>
-          </a:p>
-          <a:p>
-            <a:pPr>
-              <a:lnSpc>
-                <a:spcPct val="100000"/>
-              </a:lnSpc>
-            </a:pPr>
-            <a:r>
-              <a:rPr lang="en-US" altLang="ko-KR"/>
-              <a:t>Implementing Controller</a:t>
-            </a:r>
-          </a:p>
-          <a:p>
-            <a:pPr lvl="1">
-              <a:lnSpc>
-                <a:spcPct val="100000"/>
-              </a:lnSpc>
-            </a:pPr>
-            <a:r>
-              <a:rPr lang="en-US" altLang="ko-KR"/>
-              <a:t>Youtube</a:t>
-            </a:r>
-          </a:p>
-          <a:p>
-            <a:pPr lvl="2">
-              <a:lnSpc>
-                <a:spcPct val="100000"/>
-              </a:lnSpc>
-            </a:pPr>
-            <a:endParaRPr lang="en-US" altLang="ko-KR"/>
-          </a:p>
-          <a:p>
-            <a:pPr lvl="1">
-              <a:lnSpc>
-                <a:spcPct val="100000"/>
-              </a:lnSpc>
-            </a:pPr>
-            <a:r>
-              <a:rPr lang="en-US" altLang="ko-KR"/>
-              <a:t>Modified test controller  → Uploaded on Github</a:t>
-            </a:r>
-          </a:p>
-          <a:p>
-            <a:pPr lvl="1">
-              <a:lnSpc>
-                <a:spcPct val="100000"/>
-              </a:lnSpc>
-            </a:pPr>
-            <a:endParaRPr lang="en-US" altLang="ko-KR"/>
-          </a:p>
-          <a:p>
-            <a:pPr>
-              <a:lnSpc>
-                <a:spcPct val="100000"/>
-              </a:lnSpc>
-            </a:pPr>
-            <a:r>
-              <a:rPr lang="en-US" altLang="ko-KR"/>
-              <a:t>C #</a:t>
-            </a:r>
-          </a:p>
-          <a:p>
-            <a:pPr>
-              <a:lnSpc>
-                <a:spcPct val="100000"/>
-              </a:lnSpc>
-            </a:pPr>
-            <a:endParaRPr lang="en-US" altLang="ko-KR"/>
-          </a:p>
-          <a:p>
-            <a:pPr>
-              <a:lnSpc>
-                <a:spcPct val="100000"/>
-              </a:lnSpc>
-            </a:pPr>
-            <a:r>
-              <a:rPr lang="en-US" altLang="ko-KR"/>
-              <a:t>Another simulator ?</a:t>
-            </a:r>
-          </a:p>
-          <a:p>
-            <a:pPr>
-              <a:lnSpc>
-                <a:spcPct val="100000"/>
-              </a:lnSpc>
-            </a:pPr>
-            <a:endParaRPr lang="en-US" altLang="ko-KR"/>
+            <a:endParaRPr lang="en-US" altLang="ko-KR" dirty="0"/>
           </a:p>
           <a:p>
             <a:pPr lvl="1">
@@ -4713,7 +5051,7 @@
     </p:spTree>
     <p:extLst>
       <p:ext uri="{BB962C8B-B14F-4D97-AF65-F5344CB8AC3E}">
-        <p14:creationId xmlns:p14="http://schemas.microsoft.com/office/powerpoint/2010/main" val="1105611087"/>
+        <p14:creationId xmlns:p14="http://schemas.microsoft.com/office/powerpoint/2010/main" val="2909904117"/>
       </p:ext>
     </p:extLst>
   </p:cSld>
@@ -4724,7 +5062,7 @@
 </file>
 
 <file path=ppt/slides/slide3.xml><?xml version="1.0" encoding="utf-8"?>
-<p:sld xmlns:a="http://schemas.openxmlformats.org/drawingml/2006/main" xmlns:r="http://schemas.openxmlformats.org/officeDocument/2006/relationships" xmlns:p="http://schemas.openxmlformats.org/presentationml/2006/main">
+<p:sld xmlns:a="http://schemas.openxmlformats.org/drawingml/2006/main" xmlns:r="http://schemas.openxmlformats.org/officeDocument/2006/relationships" xmlns:p="http://schemas.openxmlformats.org/presentationml/2006/main" show="0">
   <p:cSld>
     <p:spTree>
       <p:nvGrpSpPr>
@@ -4798,7 +5136,7 @@
           <a:p>
             <a:r>
               <a:rPr lang="en-US" altLang="ko-KR"/>
-              <a:t>Proposal – Adverserial agent</a:t>
+              <a:t>Proposal – DeepRL</a:t>
             </a:r>
             <a:endParaRPr lang="ko-KR" altLang="en-US" dirty="0"/>
           </a:p>
@@ -4839,234 +5177,211 @@
             </a:pPr>
             <a:r>
               <a:rPr lang="en-US" altLang="ko-KR"/>
-              <a:t>RL Test w code</a:t>
-            </a:r>
+              <a:t>RL – Training Algorithm</a:t>
+            </a:r>
+          </a:p>
+          <a:p>
+            <a:pPr lvl="1">
+              <a:lnSpc>
+                <a:spcPct val="100000"/>
+              </a:lnSpc>
+            </a:pPr>
+            <a:r>
+              <a:rPr lang="en-US" altLang="ko-KR"/>
+              <a:t>Soft Actor-Critc (SAC) → Only single agent</a:t>
+            </a:r>
+          </a:p>
+          <a:p>
+            <a:pPr lvl="2">
+              <a:lnSpc>
+                <a:spcPct val="100000"/>
+              </a:lnSpc>
+            </a:pPr>
+            <a:r>
+              <a:rPr lang="en-US" altLang="ko-KR"/>
+              <a:t>Off-policy deep RL based on maxent</a:t>
+            </a:r>
+          </a:p>
+          <a:p>
+            <a:pPr lvl="2">
+              <a:lnSpc>
+                <a:spcPct val="100000"/>
+              </a:lnSpc>
+            </a:pPr>
+            <a:r>
+              <a:rPr lang="en-US" altLang="ko-KR"/>
+              <a:t>Actor: learning the policy (maximize expected reward)</a:t>
+            </a:r>
+          </a:p>
+          <a:p>
+            <a:pPr lvl="2">
+              <a:lnSpc>
+                <a:spcPct val="100000"/>
+              </a:lnSpc>
+            </a:pPr>
+            <a:r>
+              <a:rPr lang="en-US" altLang="ko-KR"/>
+              <a:t>Critic: maximize its entropy in each visited state</a:t>
+            </a:r>
+          </a:p>
+          <a:p>
+            <a:pPr lvl="2">
+              <a:lnSpc>
+                <a:spcPct val="100000"/>
+              </a:lnSpc>
+            </a:pPr>
+            <a:endParaRPr lang="en-US" altLang="ko-KR"/>
+          </a:p>
+          <a:p>
+            <a:pPr lvl="1">
+              <a:lnSpc>
+                <a:spcPct val="100000"/>
+              </a:lnSpc>
+            </a:pPr>
+            <a:endParaRPr lang="en-US" altLang="ko-KR" b="1"/>
+          </a:p>
+          <a:p>
+            <a:pPr lvl="1">
+              <a:lnSpc>
+                <a:spcPct val="100000"/>
+              </a:lnSpc>
+            </a:pPr>
+            <a:endParaRPr lang="en-US" altLang="ko-KR"/>
+          </a:p>
+          <a:p>
+            <a:pPr lvl="1">
+              <a:lnSpc>
+                <a:spcPct val="100000"/>
+              </a:lnSpc>
+            </a:pPr>
+            <a:endParaRPr lang="en-US" altLang="ko-KR"/>
+          </a:p>
+          <a:p>
+            <a:pPr lvl="2">
+              <a:lnSpc>
+                <a:spcPct val="100000"/>
+              </a:lnSpc>
+            </a:pPr>
+            <a:endParaRPr lang="en-US" altLang="ko-KR"/>
+          </a:p>
+          <a:p>
+            <a:pPr lvl="1">
+              <a:lnSpc>
+                <a:spcPct val="100000"/>
+              </a:lnSpc>
+            </a:pPr>
             <a:endParaRPr lang="en-US" altLang="ko-KR" dirty="0"/>
           </a:p>
           <a:p>
+            <a:pPr>
+              <a:lnSpc>
+                <a:spcPct val="100000"/>
+              </a:lnSpc>
+            </a:pPr>
+            <a:endParaRPr lang="en-US" altLang="ko-KR" dirty="0"/>
+          </a:p>
+          <a:p>
             <a:pPr lvl="1">
               <a:lnSpc>
                 <a:spcPct val="100000"/>
               </a:lnSpc>
             </a:pPr>
+            <a:endParaRPr lang="en-US" altLang="ko-KR" dirty="0"/>
+          </a:p>
+          <a:p>
+            <a:pPr lvl="2">
+              <a:lnSpc>
+                <a:spcPct val="100000"/>
+              </a:lnSpc>
+            </a:pPr>
+            <a:endParaRPr lang="en-US" altLang="ko-KR" dirty="0"/>
+          </a:p>
+          <a:p>
+            <a:pPr lvl="1">
+              <a:lnSpc>
+                <a:spcPct val="100000"/>
+              </a:lnSpc>
+            </a:pPr>
+            <a:endParaRPr lang="en-US" altLang="ko-KR" dirty="0"/>
+          </a:p>
+          <a:p>
+            <a:pPr lvl="1">
+              <a:lnSpc>
+                <a:spcPct val="100000"/>
+              </a:lnSpc>
+            </a:pPr>
+            <a:endParaRPr lang="en-US" altLang="ko-KR" dirty="0"/>
+          </a:p>
+        </p:txBody>
+      </p:sp>
+      <p:sp>
+        <p:nvSpPr>
+          <p:cNvPr id="6" name="바닥글 개체 틀 5">
+            <a:extLst>
+              <a:ext uri="{FF2B5EF4-FFF2-40B4-BE49-F238E27FC236}">
+                <a16:creationId xmlns:a16="http://schemas.microsoft.com/office/drawing/2014/main" id="{B608D172-FFC8-47AD-A215-587A20448F8B}"/>
+              </a:ext>
+            </a:extLst>
+          </p:cNvPr>
+          <p:cNvSpPr>
+            <a:spLocks noGrp="1"/>
+          </p:cNvSpPr>
+          <p:nvPr>
+            <p:ph type="ftr" sz="quarter" idx="11"/>
+          </p:nvPr>
+        </p:nvSpPr>
+        <p:spPr>
+          <a:xfrm>
+            <a:off x="136664" y="6244291"/>
+            <a:ext cx="8866020" cy="212349"/>
+          </a:xfrm>
+        </p:spPr>
+        <p:txBody>
+          <a:bodyPr/>
+          <a:lstStyle/>
+          <a:p>
             <a:r>
               <a:rPr lang="en-US" altLang="ko-KR"/>
-              <a:t>Paper</a:t>
-            </a:r>
-          </a:p>
-          <a:p>
-            <a:pPr lvl="2">
-              <a:lnSpc>
-                <a:spcPct val="100000"/>
-              </a:lnSpc>
-            </a:pPr>
-            <a:r>
-              <a:rPr lang="en-US" altLang="ko-KR"/>
-              <a:t>Multi-vehicle routing problems with soft time windows: A multi-agent reinforcement learning approach </a:t>
-            </a:r>
-          </a:p>
-          <a:p>
-            <a:pPr lvl="2">
-              <a:lnSpc>
-                <a:spcPct val="100000"/>
-              </a:lnSpc>
-            </a:pPr>
-            <a:r>
-              <a:rPr lang="en-US" altLang="ko-KR"/>
-              <a:t>ADVERSARIAL POLICIES: ATTACKING DEEP REINFORCEMENT LEARNING</a:t>
-            </a:r>
-            <a:endParaRPr lang="en-US" altLang="ko-KR">
-              <a:hlinkClick r:id="rId2"/>
-            </a:endParaRPr>
-          </a:p>
-          <a:p>
-            <a:pPr lvl="1">
-              <a:lnSpc>
-                <a:spcPct val="100000"/>
-              </a:lnSpc>
-            </a:pPr>
-            <a:endParaRPr lang="en-US" altLang="ko-KR">
-              <a:hlinkClick r:id="rId2"/>
-            </a:endParaRPr>
-          </a:p>
-          <a:p>
-            <a:pPr lvl="1">
-              <a:lnSpc>
-                <a:spcPct val="100000"/>
-              </a:lnSpc>
-            </a:pPr>
-            <a:r>
-              <a:rPr lang="en-US" altLang="ko-KR">
-                <a:hlinkClick r:id="rId2"/>
-              </a:rPr>
-              <a:t>Code</a:t>
-            </a:r>
-          </a:p>
-          <a:p>
-            <a:pPr lvl="2">
-              <a:lnSpc>
-                <a:spcPct val="100000"/>
-              </a:lnSpc>
-            </a:pPr>
-            <a:r>
-              <a:rPr lang="en-US" altLang="ko-KR">
-                <a:hlinkClick r:id="rId2"/>
-              </a:rPr>
-              <a:t>https</a:t>
-            </a:r>
-            <a:r>
-              <a:rPr lang="en-US" altLang="ko-KR" dirty="0">
-                <a:hlinkClick r:id="rId2"/>
-              </a:rPr>
-              <a:t>://github.com/HumanCompatibleAI</a:t>
-            </a:r>
-            <a:r>
-              <a:rPr lang="en-US" altLang="ko-KR">
-                <a:hlinkClick r:id="rId2"/>
-              </a:rPr>
-              <a:t>/adversarial-policies</a:t>
-            </a:r>
-            <a:endParaRPr lang="en-US" altLang="ko-KR"/>
-          </a:p>
-          <a:p>
-            <a:pPr lvl="2">
-              <a:lnSpc>
-                <a:spcPct val="100000"/>
-              </a:lnSpc>
-            </a:pPr>
-            <a:r>
-              <a:rPr lang="en-US" altLang="ko-KR"/>
-              <a:t>MLCS lab RL code…</a:t>
-            </a:r>
-          </a:p>
-          <a:p>
-            <a:pPr lvl="3">
-              <a:lnSpc>
-                <a:spcPct val="100000"/>
-              </a:lnSpc>
-            </a:pPr>
-            <a:r>
-              <a:rPr lang="en-US" altLang="ko-KR"/>
-              <a:t>CARLA Sim., Unity, Mujoco etc.</a:t>
-            </a:r>
-          </a:p>
-          <a:p>
-            <a:pPr lvl="2">
-              <a:lnSpc>
-                <a:spcPct val="100000"/>
-              </a:lnSpc>
-            </a:pPr>
-            <a:r>
-              <a:rPr lang="en-US" altLang="ko-KR"/>
-              <a:t>State, Action, Reward, Environment, Policy, Deep RL, </a:t>
-            </a:r>
-          </a:p>
-          <a:p>
-            <a:pPr lvl="2">
-              <a:lnSpc>
-                <a:spcPct val="100000"/>
-              </a:lnSpc>
-            </a:pPr>
-            <a:r>
-              <a:rPr lang="en-US" altLang="ko-KR"/>
-              <a:t>Agent – Adverserial agent</a:t>
-            </a:r>
-            <a:endParaRPr lang="en-US" altLang="ko-KR" dirty="0"/>
-          </a:p>
-          <a:p>
-            <a:pPr lvl="1">
-              <a:lnSpc>
-                <a:spcPct val="100000"/>
-              </a:lnSpc>
-            </a:pPr>
-            <a:endParaRPr lang="en-US" altLang="ko-KR" dirty="0"/>
-          </a:p>
-          <a:p>
-            <a:pPr lvl="1">
-              <a:lnSpc>
-                <a:spcPct val="100000"/>
-              </a:lnSpc>
-            </a:pPr>
-            <a:r>
-              <a:rPr lang="en-US" altLang="ko-KR"/>
-              <a:t>Multi-agent RMFS w RL ?</a:t>
-            </a:r>
-            <a:endParaRPr lang="en-US" altLang="ko-KR" dirty="0"/>
-          </a:p>
-          <a:p>
-            <a:pPr lvl="2">
-              <a:lnSpc>
-                <a:spcPct val="100000"/>
-              </a:lnSpc>
-            </a:pPr>
-            <a:r>
-              <a:rPr lang="en-US" altLang="ko-KR"/>
-              <a:t>No source code yet</a:t>
-            </a:r>
-            <a:endParaRPr lang="en-US" altLang="ko-KR" dirty="0"/>
-          </a:p>
-          <a:p>
-            <a:pPr lvl="2">
-              <a:lnSpc>
-                <a:spcPct val="100000"/>
-              </a:lnSpc>
-            </a:pPr>
-            <a:endParaRPr lang="en-US" altLang="ko-KR"/>
-          </a:p>
-          <a:p>
-            <a:pPr lvl="1">
-              <a:lnSpc>
-                <a:spcPct val="100000"/>
-              </a:lnSpc>
-            </a:pPr>
-            <a:endParaRPr lang="en-US" altLang="ko-KR" dirty="0"/>
-          </a:p>
-          <a:p>
-            <a:pPr>
-              <a:lnSpc>
-                <a:spcPct val="100000"/>
-              </a:lnSpc>
-            </a:pPr>
-            <a:endParaRPr lang="en-US" altLang="ko-KR" dirty="0"/>
-          </a:p>
-          <a:p>
-            <a:pPr lvl="1">
-              <a:lnSpc>
-                <a:spcPct val="100000"/>
-              </a:lnSpc>
-            </a:pPr>
-            <a:endParaRPr lang="en-US" altLang="ko-KR" dirty="0"/>
-          </a:p>
-          <a:p>
-            <a:pPr lvl="2">
-              <a:lnSpc>
-                <a:spcPct val="100000"/>
-              </a:lnSpc>
-            </a:pPr>
-            <a:endParaRPr lang="en-US" altLang="ko-KR" dirty="0"/>
-          </a:p>
-          <a:p>
-            <a:pPr lvl="1">
-              <a:lnSpc>
-                <a:spcPct val="100000"/>
-              </a:lnSpc>
-            </a:pPr>
-            <a:endParaRPr lang="en-US" altLang="ko-KR" dirty="0"/>
-          </a:p>
-          <a:p>
-            <a:pPr lvl="1">
-              <a:lnSpc>
-                <a:spcPct val="100000"/>
-              </a:lnSpc>
-            </a:pPr>
-            <a:endParaRPr lang="en-US" altLang="ko-KR" dirty="0"/>
-          </a:p>
-        </p:txBody>
-      </p:sp>
+              <a:t>Celli, Andrea, et al. "Coordination in Adversarial Sequential Team Games via Multi-Agent Deep Reinforcement Learning." arXiv preprint arXiv:1912.07712 (2019).</a:t>
+            </a:r>
+            <a:endParaRPr lang="ko-KR" altLang="en-US"/>
+          </a:p>
+        </p:txBody>
+      </p:sp>
+      <p:pic>
+        <p:nvPicPr>
+          <p:cNvPr id="8" name="그림 7">
+            <a:extLst>
+              <a:ext uri="{FF2B5EF4-FFF2-40B4-BE49-F238E27FC236}">
+                <a16:creationId xmlns:a16="http://schemas.microsoft.com/office/drawing/2014/main" id="{05B309D5-BFD1-4F14-AD34-F7270806DBEA}"/>
+              </a:ext>
+            </a:extLst>
+          </p:cNvPr>
+          <p:cNvPicPr>
+            <a:picLocks noChangeAspect="1"/>
+          </p:cNvPicPr>
+          <p:nvPr/>
+        </p:nvPicPr>
+        <p:blipFill>
+          <a:blip r:embed="rId2"/>
+          <a:stretch>
+            <a:fillRect/>
+          </a:stretch>
+        </p:blipFill>
+        <p:spPr>
+          <a:xfrm>
+            <a:off x="2649371" y="2652712"/>
+            <a:ext cx="3845257" cy="621539"/>
+          </a:xfrm>
+          <a:prstGeom prst="rect">
+            <a:avLst/>
+          </a:prstGeom>
+        </p:spPr>
+      </p:pic>
     </p:spTree>
     <p:extLst>
       <p:ext uri="{BB962C8B-B14F-4D97-AF65-F5344CB8AC3E}">
-        <p14:creationId xmlns:p14="http://schemas.microsoft.com/office/powerpoint/2010/main" val="1154020118"/>
+        <p14:creationId xmlns:p14="http://schemas.microsoft.com/office/powerpoint/2010/main" val="1725595981"/>
       </p:ext>
     </p:extLst>
   </p:cSld>
@@ -5151,7 +5466,7 @@
           <a:p>
             <a:r>
               <a:rPr lang="en-US" altLang="ko-KR"/>
-              <a:t>Proposal – Bench mark</a:t>
+              <a:t>Proposal – DeepRL</a:t>
             </a:r>
             <a:endParaRPr lang="ko-KR" altLang="en-US" dirty="0"/>
           </a:p>
@@ -5192,7 +5507,7 @@
             </a:pPr>
             <a:r>
               <a:rPr lang="en-US" altLang="ko-KR"/>
-              <a:t>RAWSim-O Analysis</a:t>
+              <a:t>RL – Training Algorithm</a:t>
             </a:r>
           </a:p>
           <a:p>
@@ -5203,7 +5518,18 @@
             </a:pPr>
             <a:r>
               <a:rPr lang="en-US" altLang="ko-KR"/>
-              <a:t>Analysis for each method</a:t>
+              <a:t>Soft Actor-Critc (SAC) → Only single agent</a:t>
+            </a:r>
+          </a:p>
+          <a:p>
+            <a:pPr lvl="2">
+              <a:lnSpc>
+                <a:spcPct val="100000"/>
+              </a:lnSpc>
+            </a:pPr>
+            <a:r>
+              <a:rPr lang="en-US" altLang="ko-KR"/>
+              <a:t>Off-policy deep RL based on maxent</a:t>
             </a:r>
           </a:p>
           <a:p>
@@ -5212,10 +5538,118 @@
                 <a:spcPct val="100000"/>
               </a:lnSpc>
             </a:pPr>
+            <a:endParaRPr lang="en-US" altLang="ko-KR" b="1"/>
+          </a:p>
+          <a:p>
+            <a:pPr lvl="1">
+              <a:lnSpc>
+                <a:spcPct val="100000"/>
+              </a:lnSpc>
+            </a:pPr>
+            <a:r>
+              <a:rPr lang="en-US" altLang="ko-KR" b="1"/>
+              <a:t>Multi-Agent</a:t>
+            </a:r>
             <a:r>
               <a:rPr lang="en-US" altLang="ko-KR"/>
-              <a:t>Simulation results</a:t>
-            </a:r>
+              <a:t> SAC (STAC)</a:t>
+            </a:r>
+            <a:r>
+              <a:rPr lang="en-US" altLang="ko-KR" baseline="30000"/>
+              <a:t>1</a:t>
+            </a:r>
+          </a:p>
+          <a:p>
+            <a:pPr lvl="2">
+              <a:lnSpc>
+                <a:spcPct val="100000"/>
+              </a:lnSpc>
+            </a:pPr>
+            <a:r>
+              <a:rPr lang="en-US" altLang="ko-KR"/>
+              <a:t>Centralized training with decentralized execution</a:t>
+            </a:r>
+            <a:endParaRPr lang="en-US" altLang="ko-KR" baseline="30000"/>
+          </a:p>
+          <a:p>
+            <a:pPr lvl="2">
+              <a:lnSpc>
+                <a:spcPct val="100000"/>
+              </a:lnSpc>
+            </a:pPr>
+            <a:r>
+              <a:rPr lang="en-US" altLang="ko-KR"/>
+              <a:t>Exploit extra information during training</a:t>
+            </a:r>
+          </a:p>
+          <a:p>
+            <a:pPr lvl="2">
+              <a:lnSpc>
+                <a:spcPct val="100000"/>
+              </a:lnSpc>
+            </a:pPr>
+            <a:r>
+              <a:rPr lang="en-US" altLang="ko-KR"/>
+              <a:t>Multi-agent planning</a:t>
+            </a:r>
+          </a:p>
+          <a:p>
+            <a:pPr lvl="2">
+              <a:lnSpc>
+                <a:spcPct val="100000"/>
+              </a:lnSpc>
+            </a:pPr>
+            <a:r>
+              <a:rPr lang="en-US" altLang="ko-KR"/>
+              <a:t>Multi-agent deep RL</a:t>
+            </a:r>
+            <a:br>
+              <a:rPr lang="en-US" altLang="ko-KR"/>
+            </a:br>
+            <a:r>
+              <a:rPr lang="en-US" altLang="ko-KR"/>
+              <a:t>(cooperative behavior)</a:t>
+            </a:r>
+          </a:p>
+          <a:p>
+            <a:pPr lvl="2">
+              <a:lnSpc>
+                <a:spcPct val="100000"/>
+              </a:lnSpc>
+            </a:pPr>
+            <a:endParaRPr lang="en-US" altLang="ko-KR"/>
+          </a:p>
+          <a:p>
+            <a:pPr lvl="1">
+              <a:lnSpc>
+                <a:spcPct val="100000"/>
+              </a:lnSpc>
+            </a:pPr>
+            <a:endParaRPr lang="en-US" altLang="ko-KR"/>
+          </a:p>
+          <a:p>
+            <a:pPr lvl="1">
+              <a:lnSpc>
+                <a:spcPct val="100000"/>
+              </a:lnSpc>
+            </a:pPr>
+            <a:endParaRPr lang="en-US" altLang="ko-KR"/>
+          </a:p>
+          <a:p>
+            <a:pPr lvl="2">
+              <a:lnSpc>
+                <a:spcPct val="100000"/>
+              </a:lnSpc>
+            </a:pPr>
+            <a:endParaRPr lang="en-US" altLang="ko-KR"/>
+          </a:p>
+          <a:p>
+            <a:pPr lvl="1">
+              <a:lnSpc>
+                <a:spcPct val="100000"/>
+              </a:lnSpc>
+            </a:pPr>
+            <a:endParaRPr lang="en-US" altLang="ko-KR" dirty="0"/>
           </a:p>
           <a:p>
             <a:pPr>
@@ -5223,122 +5657,459 @@
                 <a:spcPct val="100000"/>
               </a:lnSpc>
             </a:pPr>
-            <a:endParaRPr lang="en-US" altLang="ko-KR"/>
-          </a:p>
-          <a:p>
-            <a:pPr>
-              <a:lnSpc>
-                <a:spcPct val="100000"/>
-              </a:lnSpc>
-            </a:pPr>
+            <a:endParaRPr lang="en-US" altLang="ko-KR" dirty="0"/>
+          </a:p>
+          <a:p>
+            <a:pPr lvl="1">
+              <a:lnSpc>
+                <a:spcPct val="100000"/>
+              </a:lnSpc>
+            </a:pPr>
+            <a:endParaRPr lang="en-US" altLang="ko-KR" dirty="0"/>
+          </a:p>
+          <a:p>
+            <a:pPr lvl="2">
+              <a:lnSpc>
+                <a:spcPct val="100000"/>
+              </a:lnSpc>
+            </a:pPr>
+            <a:endParaRPr lang="en-US" altLang="ko-KR" dirty="0"/>
+          </a:p>
+          <a:p>
+            <a:pPr lvl="1">
+              <a:lnSpc>
+                <a:spcPct val="100000"/>
+              </a:lnSpc>
+            </a:pPr>
+            <a:endParaRPr lang="en-US" altLang="ko-KR" dirty="0"/>
+          </a:p>
+          <a:p>
+            <a:pPr lvl="1">
+              <a:lnSpc>
+                <a:spcPct val="100000"/>
+              </a:lnSpc>
+            </a:pPr>
+            <a:endParaRPr lang="en-US" altLang="ko-KR" dirty="0"/>
+          </a:p>
+        </p:txBody>
+      </p:sp>
+      <p:sp>
+        <p:nvSpPr>
+          <p:cNvPr id="6" name="바닥글 개체 틀 5">
+            <a:extLst>
+              <a:ext uri="{FF2B5EF4-FFF2-40B4-BE49-F238E27FC236}">
+                <a16:creationId xmlns:a16="http://schemas.microsoft.com/office/drawing/2014/main" id="{B608D172-FFC8-47AD-A215-587A20448F8B}"/>
+              </a:ext>
+            </a:extLst>
+          </p:cNvPr>
+          <p:cNvSpPr>
+            <a:spLocks noGrp="1"/>
+          </p:cNvSpPr>
+          <p:nvPr>
+            <p:ph type="ftr" sz="quarter" idx="11"/>
+          </p:nvPr>
+        </p:nvSpPr>
+        <p:spPr>
+          <a:xfrm>
+            <a:off x="136664" y="6244291"/>
+            <a:ext cx="8866020" cy="212349"/>
+          </a:xfrm>
+        </p:spPr>
+        <p:txBody>
+          <a:bodyPr/>
+          <a:lstStyle/>
+          <a:p>
             <a:r>
               <a:rPr lang="en-US" altLang="ko-KR"/>
-              <a:t>Google OR-Tools</a:t>
-            </a:r>
-          </a:p>
-          <a:p>
-            <a:pPr>
-              <a:lnSpc>
-                <a:spcPct val="100000"/>
-              </a:lnSpc>
-            </a:pPr>
-            <a:endParaRPr lang="en-US" altLang="ko-KR"/>
-          </a:p>
-          <a:p>
-            <a:pPr>
-              <a:lnSpc>
-                <a:spcPct val="100000"/>
-              </a:lnSpc>
-            </a:pPr>
-            <a:endParaRPr lang="en-US" altLang="ko-KR"/>
-          </a:p>
-          <a:p>
-            <a:pPr>
-              <a:lnSpc>
-                <a:spcPct val="100000"/>
-              </a:lnSpc>
-            </a:pPr>
-            <a:r>
-              <a:rPr lang="en-US" altLang="ko-KR"/>
-              <a:t>Other popular algorithm</a:t>
-            </a:r>
-          </a:p>
-          <a:p>
-            <a:pPr lvl="1">
-              <a:lnSpc>
-                <a:spcPct val="100000"/>
-              </a:lnSpc>
-            </a:pPr>
-            <a:r>
-              <a:rPr lang="en-US" altLang="ko-KR"/>
-              <a:t>Genetic algorithm</a:t>
-            </a:r>
-          </a:p>
-          <a:p>
-            <a:pPr lvl="1">
-              <a:lnSpc>
-                <a:spcPct val="100000"/>
-              </a:lnSpc>
-            </a:pPr>
-            <a:r>
-              <a:rPr lang="en-US" altLang="ko-KR"/>
-              <a:t>Iterated local search algorithm (ILS)</a:t>
-            </a:r>
-          </a:p>
-          <a:p>
-            <a:pPr lvl="1">
-              <a:lnSpc>
-                <a:spcPct val="100000"/>
-              </a:lnSpc>
-            </a:pPr>
-            <a:endParaRPr lang="en-US" altLang="ko-KR" dirty="0"/>
-          </a:p>
-          <a:p>
-            <a:pPr>
-              <a:lnSpc>
-                <a:spcPct val="100000"/>
-              </a:lnSpc>
-            </a:pPr>
-            <a:endParaRPr lang="en-US" altLang="ko-KR" dirty="0"/>
-          </a:p>
-          <a:p>
-            <a:pPr lvl="1">
-              <a:lnSpc>
-                <a:spcPct val="100000"/>
-              </a:lnSpc>
-            </a:pPr>
-            <a:endParaRPr lang="en-US" altLang="ko-KR" dirty="0"/>
-          </a:p>
-          <a:p>
-            <a:pPr lvl="2">
-              <a:lnSpc>
-                <a:spcPct val="100000"/>
-              </a:lnSpc>
-            </a:pPr>
-            <a:endParaRPr lang="en-US" altLang="ko-KR" dirty="0"/>
-          </a:p>
-          <a:p>
-            <a:pPr lvl="1">
-              <a:lnSpc>
-                <a:spcPct val="100000"/>
-              </a:lnSpc>
-            </a:pPr>
-            <a:endParaRPr lang="en-US" altLang="ko-KR" dirty="0"/>
-          </a:p>
-          <a:p>
-            <a:pPr lvl="1">
-              <a:lnSpc>
-                <a:spcPct val="100000"/>
-              </a:lnSpc>
-            </a:pPr>
-            <a:endParaRPr lang="en-US" altLang="ko-KR" dirty="0"/>
-          </a:p>
-        </p:txBody>
-      </p:sp>
+              <a:t>Celli, Andrea, et al. "Coordination in Adversarial Sequential Team Games via Multi-Agent Deep Reinforcement Learning." arXiv preprint arXiv:1912.07712 (2019).</a:t>
+            </a:r>
+            <a:endParaRPr lang="ko-KR" altLang="en-US"/>
+          </a:p>
+        </p:txBody>
+      </p:sp>
+      <p:pic>
+        <p:nvPicPr>
+          <p:cNvPr id="8" name="그림 7">
+            <a:extLst>
+              <a:ext uri="{FF2B5EF4-FFF2-40B4-BE49-F238E27FC236}">
+                <a16:creationId xmlns:a16="http://schemas.microsoft.com/office/drawing/2014/main" id="{05B309D5-BFD1-4F14-AD34-F7270806DBEA}"/>
+              </a:ext>
+            </a:extLst>
+          </p:cNvPr>
+          <p:cNvPicPr>
+            <a:picLocks noChangeAspect="1"/>
+          </p:cNvPicPr>
+          <p:nvPr/>
+        </p:nvPicPr>
+        <p:blipFill>
+          <a:blip r:embed="rId2"/>
+          <a:stretch>
+            <a:fillRect/>
+          </a:stretch>
+        </p:blipFill>
+        <p:spPr>
+          <a:xfrm>
+            <a:off x="5750774" y="1608772"/>
+            <a:ext cx="2738583" cy="442659"/>
+          </a:xfrm>
+          <a:prstGeom prst="rect">
+            <a:avLst/>
+          </a:prstGeom>
+        </p:spPr>
+      </p:pic>
+      <p:pic>
+        <p:nvPicPr>
+          <p:cNvPr id="10" name="그림 9">
+            <a:extLst>
+              <a:ext uri="{FF2B5EF4-FFF2-40B4-BE49-F238E27FC236}">
+                <a16:creationId xmlns:a16="http://schemas.microsoft.com/office/drawing/2014/main" id="{C3224E5C-54C8-4677-B830-118B8D77D3A6}"/>
+              </a:ext>
+            </a:extLst>
+          </p:cNvPr>
+          <p:cNvPicPr>
+            <a:picLocks noChangeAspect="1"/>
+          </p:cNvPicPr>
+          <p:nvPr/>
+        </p:nvPicPr>
+        <p:blipFill>
+          <a:blip r:embed="rId3"/>
+          <a:stretch>
+            <a:fillRect/>
+          </a:stretch>
+        </p:blipFill>
+        <p:spPr>
+          <a:xfrm>
+            <a:off x="4036248" y="3427740"/>
+            <a:ext cx="4966436" cy="2698380"/>
+          </a:xfrm>
+          <a:prstGeom prst="rect">
+            <a:avLst/>
+          </a:prstGeom>
+        </p:spPr>
+      </p:pic>
     </p:spTree>
     <p:extLst>
       <p:ext uri="{BB962C8B-B14F-4D97-AF65-F5344CB8AC3E}">
-        <p14:creationId xmlns:p14="http://schemas.microsoft.com/office/powerpoint/2010/main" val="1399203736"/>
+        <p14:creationId xmlns:p14="http://schemas.microsoft.com/office/powerpoint/2010/main" val="1656516369"/>
+      </p:ext>
+    </p:extLst>
+  </p:cSld>
+  <p:clrMapOvr>
+    <a:masterClrMapping/>
+  </p:clrMapOvr>
+</p:sld>
+</file>
+
+<file path=ppt/slides/slide5.xml><?xml version="1.0" encoding="utf-8"?>
+<p:sld xmlns:a="http://schemas.openxmlformats.org/drawingml/2006/main" xmlns:r="http://schemas.openxmlformats.org/officeDocument/2006/relationships" xmlns:p="http://schemas.openxmlformats.org/presentationml/2006/main">
+  <p:cSld>
+    <p:spTree>
+      <p:nvGrpSpPr>
+        <p:cNvPr id="1" name=""/>
+        <p:cNvGrpSpPr/>
+        <p:nvPr/>
+      </p:nvGrpSpPr>
+      <p:grpSpPr>
+        <a:xfrm>
+          <a:off x="0" y="0"/>
+          <a:ext cx="0" cy="0"/>
+          <a:chOff x="0" y="0"/>
+          <a:chExt cx="0" cy="0"/>
+        </a:xfrm>
+      </p:grpSpPr>
+      <p:sp>
+        <p:nvSpPr>
+          <p:cNvPr id="2" name="슬라이드 번호 개체 틀 1">
+            <a:extLst>
+              <a:ext uri="{FF2B5EF4-FFF2-40B4-BE49-F238E27FC236}">
+                <a16:creationId xmlns:a16="http://schemas.microsoft.com/office/drawing/2014/main" id="{46CC4388-5CBE-4814-8E8B-FAB97B394E89}"/>
+              </a:ext>
+            </a:extLst>
+          </p:cNvPr>
+          <p:cNvSpPr>
+            <a:spLocks noGrp="1"/>
+          </p:cNvSpPr>
+          <p:nvPr>
+            <p:ph type="sldNum" sz="quarter" idx="12"/>
+          </p:nvPr>
+        </p:nvSpPr>
+        <p:spPr/>
+        <p:txBody>
+          <a:bodyPr/>
+          <a:lstStyle/>
+          <a:p>
+            <a:fld id="{A1806F79-321D-440B-81D1-3409D93E33A7}" type="slidenum">
+              <a:rPr lang="ko-KR" altLang="en-US" smtClean="0"/>
+              <a:pPr/>
+              <a:t>5</a:t>
+            </a:fld>
+            <a:endParaRPr lang="ko-KR" altLang="en-US"/>
+          </a:p>
+        </p:txBody>
+      </p:sp>
+      <p:sp>
+        <p:nvSpPr>
+          <p:cNvPr id="3" name="제목 2">
+            <a:extLst>
+              <a:ext uri="{FF2B5EF4-FFF2-40B4-BE49-F238E27FC236}">
+                <a16:creationId xmlns:a16="http://schemas.microsoft.com/office/drawing/2014/main" id="{047B81AA-680E-486D-99E8-DCEB0D351281}"/>
+              </a:ext>
+            </a:extLst>
+          </p:cNvPr>
+          <p:cNvSpPr>
+            <a:spLocks noGrp="1"/>
+          </p:cNvSpPr>
+          <p:nvPr>
+            <p:ph type="title"/>
+          </p:nvPr>
+        </p:nvSpPr>
+        <p:spPr>
+          <a:xfrm>
+            <a:off x="136664" y="54593"/>
+            <a:ext cx="7886700" cy="665018"/>
+          </a:xfrm>
+        </p:spPr>
+        <p:txBody>
+          <a:bodyPr/>
+          <a:lstStyle/>
+          <a:p>
+            <a:r>
+              <a:rPr lang="en-US" altLang="ko-KR"/>
+              <a:t>Proposal – Adverserial agent</a:t>
+            </a:r>
+            <a:endParaRPr lang="ko-KR" altLang="en-US" dirty="0"/>
+          </a:p>
+        </p:txBody>
+      </p:sp>
+      <p:sp>
+        <p:nvSpPr>
+          <p:cNvPr id="4" name="텍스트 개체 틀 3">
+            <a:extLst>
+              <a:ext uri="{FF2B5EF4-FFF2-40B4-BE49-F238E27FC236}">
+                <a16:creationId xmlns:a16="http://schemas.microsoft.com/office/drawing/2014/main" id="{A599E83A-0476-45EA-AE26-18AE31709B9B}"/>
+              </a:ext>
+            </a:extLst>
+          </p:cNvPr>
+          <p:cNvSpPr>
+            <a:spLocks noGrp="1"/>
+          </p:cNvSpPr>
+          <p:nvPr>
+            <p:ph type="body" sz="quarter" idx="13"/>
+          </p:nvPr>
+        </p:nvSpPr>
+        <p:spPr>
+          <a:xfrm>
+            <a:off x="207963" y="955954"/>
+            <a:ext cx="8794721" cy="5394512"/>
+          </a:xfrm>
+        </p:spPr>
+        <p:txBody>
+          <a:bodyPr>
+            <a:normAutofit/>
+          </a:bodyPr>
+          <a:lstStyle/>
+          <a:p>
+            <a:pPr>
+              <a:lnSpc>
+                <a:spcPct val="100000"/>
+              </a:lnSpc>
+            </a:pPr>
+            <a:r>
+              <a:rPr lang="en-US" altLang="ko-KR"/>
+              <a:t>Limitation </a:t>
+            </a:r>
+            <a:endParaRPr lang="en-US" altLang="ko-KR" dirty="0"/>
+          </a:p>
+          <a:p>
+            <a:pPr lvl="1">
+              <a:lnSpc>
+                <a:spcPct val="100000"/>
+              </a:lnSpc>
+            </a:pPr>
+            <a:r>
+              <a:rPr lang="en-US" altLang="ko-KR"/>
+              <a:t>Little RL background</a:t>
+            </a:r>
+          </a:p>
+          <a:p>
+            <a:pPr lvl="1">
+              <a:lnSpc>
+                <a:spcPct val="100000"/>
+              </a:lnSpc>
+            </a:pPr>
+            <a:endParaRPr lang="en-US" altLang="ko-KR"/>
+          </a:p>
+          <a:p>
+            <a:pPr lvl="1">
+              <a:lnSpc>
+                <a:spcPct val="100000"/>
+              </a:lnSpc>
+            </a:pPr>
+            <a:r>
+              <a:rPr lang="en-US" altLang="ko-KR"/>
+              <a:t>Source code &amp; Environment Setup</a:t>
+            </a:r>
+          </a:p>
+          <a:p>
+            <a:pPr lvl="2">
+              <a:lnSpc>
+                <a:spcPct val="100000"/>
+              </a:lnSpc>
+            </a:pPr>
+            <a:r>
+              <a:rPr lang="en-US" altLang="ko-KR"/>
+              <a:t>No RAWSim-O</a:t>
+            </a:r>
+          </a:p>
+          <a:p>
+            <a:pPr lvl="2">
+              <a:lnSpc>
+                <a:spcPct val="100000"/>
+              </a:lnSpc>
+            </a:pPr>
+            <a:r>
+              <a:rPr lang="en-US" altLang="ko-KR"/>
+              <a:t>Adversarial policy algorithm </a:t>
+            </a:r>
+            <a:r>
+              <a:rPr lang="en-US" altLang="ko-KR" baseline="30000"/>
+              <a:t>1</a:t>
+            </a:r>
+            <a:endParaRPr lang="en-US" altLang="ko-KR" baseline="30000">
+              <a:hlinkClick r:id="rId2"/>
+            </a:endParaRPr>
+          </a:p>
+          <a:p>
+            <a:pPr lvl="2">
+              <a:lnSpc>
+                <a:spcPct val="100000"/>
+              </a:lnSpc>
+            </a:pPr>
+            <a:r>
+              <a:rPr lang="en-US" altLang="ko-KR"/>
+              <a:t>Unity </a:t>
+            </a:r>
+            <a:r>
+              <a:rPr lang="en-US" altLang="ko-KR" baseline="30000"/>
+              <a:t>2</a:t>
+            </a:r>
+          </a:p>
+          <a:p>
+            <a:pPr lvl="2">
+              <a:lnSpc>
+                <a:spcPct val="100000"/>
+              </a:lnSpc>
+            </a:pPr>
+            <a:r>
+              <a:rPr lang="en-US" altLang="ko-KR"/>
+              <a:t>MLCS RL …</a:t>
+            </a:r>
+          </a:p>
+          <a:p>
+            <a:pPr lvl="2">
+              <a:lnSpc>
+                <a:spcPct val="100000"/>
+              </a:lnSpc>
+            </a:pPr>
+            <a:r>
+              <a:rPr lang="en-US" altLang="ko-KR"/>
+              <a:t>Other</a:t>
+            </a:r>
+          </a:p>
+          <a:p>
+            <a:pPr lvl="2">
+              <a:lnSpc>
+                <a:spcPct val="100000"/>
+              </a:lnSpc>
+            </a:pPr>
+            <a:endParaRPr lang="en-US" altLang="ko-KR" dirty="0"/>
+          </a:p>
+          <a:p>
+            <a:pPr>
+              <a:lnSpc>
+                <a:spcPct val="100000"/>
+              </a:lnSpc>
+            </a:pPr>
+            <a:endParaRPr lang="en-US" altLang="ko-KR" dirty="0"/>
+          </a:p>
+          <a:p>
+            <a:pPr lvl="1">
+              <a:lnSpc>
+                <a:spcPct val="100000"/>
+              </a:lnSpc>
+            </a:pPr>
+            <a:endParaRPr lang="en-US" altLang="ko-KR" dirty="0"/>
+          </a:p>
+          <a:p>
+            <a:pPr lvl="2">
+              <a:lnSpc>
+                <a:spcPct val="100000"/>
+              </a:lnSpc>
+            </a:pPr>
+            <a:endParaRPr lang="en-US" altLang="ko-KR" dirty="0"/>
+          </a:p>
+          <a:p>
+            <a:pPr lvl="1">
+              <a:lnSpc>
+                <a:spcPct val="100000"/>
+              </a:lnSpc>
+            </a:pPr>
+            <a:endParaRPr lang="en-US" altLang="ko-KR" dirty="0"/>
+          </a:p>
+          <a:p>
+            <a:pPr lvl="1">
+              <a:lnSpc>
+                <a:spcPct val="100000"/>
+              </a:lnSpc>
+            </a:pPr>
+            <a:endParaRPr lang="en-US" altLang="ko-KR" dirty="0"/>
+          </a:p>
+        </p:txBody>
+      </p:sp>
+      <p:sp>
+        <p:nvSpPr>
+          <p:cNvPr id="6" name="바닥글 개체 틀 5">
+            <a:extLst>
+              <a:ext uri="{FF2B5EF4-FFF2-40B4-BE49-F238E27FC236}">
+                <a16:creationId xmlns:a16="http://schemas.microsoft.com/office/drawing/2014/main" id="{F4ECC236-0C69-4957-AE22-B2AB4247217B}"/>
+              </a:ext>
+            </a:extLst>
+          </p:cNvPr>
+          <p:cNvSpPr>
+            <a:spLocks noGrp="1"/>
+          </p:cNvSpPr>
+          <p:nvPr>
+            <p:ph type="ftr" sz="quarter" idx="11"/>
+          </p:nvPr>
+        </p:nvSpPr>
+        <p:spPr>
+          <a:xfrm>
+            <a:off x="136664" y="6096482"/>
+            <a:ext cx="8687296" cy="253984"/>
+          </a:xfrm>
+        </p:spPr>
+        <p:txBody>
+          <a:bodyPr/>
+          <a:lstStyle/>
+          <a:p>
+            <a:r>
+              <a:rPr lang="en-US" altLang="ko-KR"/>
+              <a:t>1 Gleave, Adam, et al. "Adversarial policies: Attacking deep reinforcement learning." arXiv preprint arXiv:1905.10615 (2019).</a:t>
+            </a:r>
+          </a:p>
+          <a:p>
+            <a:r>
+              <a:rPr lang="en-US" altLang="ko-KR"/>
+              <a:t>2 https://github.com/Unity-Technologies/ml-agents</a:t>
+            </a:r>
+            <a:endParaRPr lang="ko-KR" altLang="en-US"/>
+          </a:p>
+        </p:txBody>
+      </p:sp>
+    </p:spTree>
+    <p:extLst>
+      <p:ext uri="{BB962C8B-B14F-4D97-AF65-F5344CB8AC3E}">
+        <p14:creationId xmlns:p14="http://schemas.microsoft.com/office/powerpoint/2010/main" val="315612328"/>
       </p:ext>
     </p:extLst>
   </p:cSld>

</xml_diff>